<commit_message>
add simple field unit test
</commit_message>
<xml_diff>
--- a/mdl4ui-docs/mdl4ui_cg2013_jba_draft.pptx
+++ b/mdl4ui-docs/mdl4ui_cg2013_jba_draft.pptx
@@ -14309,7 +14309,19 @@
           <a:p>
             <a:r>
               <a:rPr lang="fr-FR" dirty="0" smtClean="0"/>
-              <a:t>Unit tests</a:t>
+              <a:t>Unit </a:t>
+            </a:r>
+            <a:r>
+              <a:rPr lang="fr-FR" dirty="0" err="1" smtClean="0"/>
+              <a:t>testing</a:t>
+            </a:r>
+            <a:r>
+              <a:rPr lang="fr-FR" dirty="0" smtClean="0"/>
+              <a:t> </a:t>
+            </a:r>
+            <a:r>
+              <a:rPr lang="fr-FR" dirty="0" err="1" smtClean="0"/>
+              <a:t>fields</a:t>
             </a:r>
             <a:endParaRPr lang="fr-FR" dirty="0"/>
           </a:p>
@@ -14327,9 +14339,94 @@
         </p:nvSpPr>
         <p:spPr/>
         <p:txBody>
-          <a:bodyPr/>
+          <a:bodyPr>
+            <a:normAutofit/>
+          </a:bodyPr>
           <a:lstStyle/>
           <a:p>
+            <a:r>
+              <a:rPr lang="en-US" dirty="0"/>
+              <a:t>Need to test </a:t>
+            </a:r>
+            <a:r>
+              <a:rPr lang="en-US" dirty="0" smtClean="0"/>
+              <a:t>fields</a:t>
+            </a:r>
+            <a:r>
+              <a:rPr lang="en-US" dirty="0"/>
+              <a:t>, using </a:t>
+            </a:r>
+            <a:r>
+              <a:rPr lang="en-US" b="1" dirty="0"/>
+              <a:t>non-regression tests</a:t>
+            </a:r>
+          </a:p>
+          <a:p>
+            <a:pPr lvl="1"/>
+            <a:r>
+              <a:rPr lang="en-US" dirty="0" smtClean="0"/>
+              <a:t>validation </a:t>
+            </a:r>
+            <a:endParaRPr lang="en-US" dirty="0"/>
+          </a:p>
+          <a:p>
+            <a:pPr lvl="1"/>
+            <a:r>
+              <a:rPr lang="en-US" dirty="0" smtClean="0"/>
+              <a:t>domain </a:t>
+            </a:r>
+            <a:r>
+              <a:rPr lang="en-US" dirty="0"/>
+              <a:t>model read &amp; update </a:t>
+            </a:r>
+          </a:p>
+          <a:p>
+            <a:pPr lvl="1"/>
+            <a:r>
+              <a:rPr lang="en-US" dirty="0" smtClean="0"/>
+              <a:t>visibility </a:t>
+            </a:r>
+            <a:r>
+              <a:rPr lang="en-US" dirty="0"/>
+              <a:t>update</a:t>
+            </a:r>
+          </a:p>
+          <a:p>
+            <a:pPr lvl="1"/>
+            <a:r>
+              <a:rPr lang="en-US" dirty="0" smtClean="0"/>
+              <a:t>domain </a:t>
+            </a:r>
+            <a:r>
+              <a:rPr lang="en-US" dirty="0"/>
+              <a:t>model </a:t>
+            </a:r>
+            <a:r>
+              <a:rPr lang="en-US" dirty="0" smtClean="0"/>
+              <a:t>reset</a:t>
+            </a:r>
+          </a:p>
+          <a:p>
+            <a:pPr lvl="1"/>
+            <a:endParaRPr lang="en-US" dirty="0"/>
+          </a:p>
+          <a:p>
+            <a:r>
+              <a:rPr lang="en-US" dirty="0"/>
+              <a:t>Generated mock factories allow to execute field </a:t>
+            </a:r>
+            <a:r>
+              <a:rPr lang="en-US" dirty="0" smtClean="0"/>
+              <a:t>outside </a:t>
+            </a:r>
+            <a:r>
+              <a:rPr lang="en-US" dirty="0"/>
+              <a:t>a </a:t>
+            </a:r>
+            <a:r>
+              <a:rPr lang="en-US" dirty="0" smtClean="0"/>
+              <a:t>web application (GWT)</a:t>
+            </a:r>
             <a:endParaRPr lang="fr-FR" dirty="0"/>
           </a:p>
         </p:txBody>
@@ -14431,7 +14528,6 @@
               <a:rPr lang="en-US" b="1" dirty="0" smtClean="0"/>
               <a:t>web applications</a:t>
             </a:r>
-            <a:endParaRPr lang="en-US" b="1" dirty="0" smtClean="0"/>
           </a:p>
           <a:p>
             <a:endParaRPr lang="en-US" dirty="0"/>
@@ -14441,7 +14537,6 @@
               <a:rPr lang="en-US" dirty="0" smtClean="0"/>
               <a:t>Supports </a:t>
             </a:r>
-            <a:endParaRPr lang="en-US" dirty="0" smtClean="0"/>
           </a:p>
           <a:p>
             <a:pPr lvl="1"/>
@@ -14462,7 +14557,7 @@
           <a:p>
             <a:pPr lvl="1"/>
             <a:r>
-              <a:rPr lang="en-US" dirty="0" smtClean="0"/>
+              <a:rPr lang="en-US" b="1" dirty="0" smtClean="0"/>
               <a:t>Firefox</a:t>
             </a:r>
             <a:r>
@@ -14473,7 +14568,6 @@
               <a:rPr lang="en-US" dirty="0" smtClean="0"/>
               <a:t>IE, iOS &amp; Android browsers, etc.</a:t>
             </a:r>
-            <a:endParaRPr lang="en-US" dirty="0" smtClean="0"/>
           </a:p>
           <a:p>
             <a:endParaRPr lang="fr-FR" dirty="0"/>
@@ -14587,11 +14681,19 @@
             </a:r>
             <a:r>
               <a:rPr lang="en-US" dirty="0"/>
-              <a:t>page object represents </a:t>
-            </a:r>
-            <a:r>
-              <a:rPr lang="en-US" dirty="0" smtClean="0"/>
-              <a:t>a screen or a block with </a:t>
+              <a:t>page object </a:t>
+            </a:r>
+            <a:r>
+              <a:rPr lang="en-US" b="1" dirty="0"/>
+              <a:t>represents </a:t>
+            </a:r>
+            <a:r>
+              <a:rPr lang="en-US" b="1" dirty="0" smtClean="0"/>
+              <a:t>a screen or a block </a:t>
+            </a:r>
+            <a:r>
+              <a:rPr lang="en-US" dirty="0" smtClean="0"/>
+              <a:t>with </a:t>
             </a:r>
             <a:r>
               <a:rPr lang="en-US" dirty="0"/>
@@ -14606,7 +14708,11 @@
             <a:pPr lvl="1"/>
             <a:r>
               <a:rPr lang="en-US" dirty="0" smtClean="0"/>
-              <a:t>expose methods to manipulate each fields</a:t>
+              <a:t>expose methods to </a:t>
+            </a:r>
+            <a:r>
+              <a:rPr lang="en-US" b="1" dirty="0" smtClean="0"/>
+              <a:t>manipulate each fields</a:t>
             </a:r>
           </a:p>
           <a:p>
@@ -14616,14 +14722,22 @@
           <a:p>
             <a:r>
               <a:rPr lang="en-US" dirty="0" smtClean="0"/>
-              <a:t>Make testing easier</a:t>
+              <a:t>Make testing </a:t>
+            </a:r>
+            <a:r>
+              <a:rPr lang="en-US" b="1" dirty="0" smtClean="0"/>
+              <a:t>easier</a:t>
             </a:r>
           </a:p>
           <a:p>
             <a:pPr lvl="1"/>
             <a:r>
-              <a:rPr lang="en-US" dirty="0" smtClean="0"/>
-              <a:t>hide </a:t>
+              <a:rPr lang="en-US" b="1" dirty="0" smtClean="0"/>
+              <a:t>hide</a:t>
+            </a:r>
+            <a:r>
+              <a:rPr lang="en-US" dirty="0" smtClean="0"/>
+              <a:t> </a:t>
             </a:r>
             <a:r>
               <a:rPr lang="en-US" dirty="0"/>
@@ -14638,8 +14752,12 @@
           <a:p>
             <a:pPr lvl="1"/>
             <a:r>
-              <a:rPr lang="en-US" dirty="0" smtClean="0"/>
-              <a:t>minimize </a:t>
+              <a:rPr lang="en-US" b="1" dirty="0" smtClean="0"/>
+              <a:t>minimize</a:t>
+            </a:r>
+            <a:r>
+              <a:rPr lang="en-US" dirty="0" smtClean="0"/>
+              <a:t> </a:t>
             </a:r>
             <a:r>
               <a:rPr lang="en-US" dirty="0"/>

</xml_diff>